<commit_message>
Adding new algorithms to work on
</commit_message>
<xml_diff>
--- a/EBooks/Diagrams.pptx
+++ b/EBooks/Diagrams.pptx
@@ -5,41 +5,43 @@
     <p:sldMasterId id="2147483648" r:id="rId1"/>
   </p:sldMasterIdLst>
   <p:notesMasterIdLst>
-    <p:notesMasterId r:id="rId34"/>
+    <p:notesMasterId r:id="rId36"/>
   </p:notesMasterIdLst>
   <p:sldIdLst>
     <p:sldId id="275" r:id="rId2"/>
     <p:sldId id="277" r:id="rId3"/>
     <p:sldId id="276" r:id="rId4"/>
-    <p:sldId id="286" r:id="rId5"/>
-    <p:sldId id="274" r:id="rId6"/>
-    <p:sldId id="273" r:id="rId7"/>
-    <p:sldId id="270" r:id="rId8"/>
-    <p:sldId id="269" r:id="rId9"/>
-    <p:sldId id="271" r:id="rId10"/>
-    <p:sldId id="265" r:id="rId11"/>
-    <p:sldId id="263" r:id="rId12"/>
-    <p:sldId id="262" r:id="rId13"/>
-    <p:sldId id="264" r:id="rId14"/>
-    <p:sldId id="261" r:id="rId15"/>
-    <p:sldId id="260" r:id="rId16"/>
-    <p:sldId id="257" r:id="rId17"/>
-    <p:sldId id="259" r:id="rId18"/>
-    <p:sldId id="281" r:id="rId19"/>
-    <p:sldId id="282" r:id="rId20"/>
-    <p:sldId id="278" r:id="rId21"/>
-    <p:sldId id="279" r:id="rId22"/>
-    <p:sldId id="283" r:id="rId23"/>
-    <p:sldId id="284" r:id="rId24"/>
-    <p:sldId id="285" r:id="rId25"/>
-    <p:sldId id="287" r:id="rId26"/>
-    <p:sldId id="288" r:id="rId27"/>
-    <p:sldId id="289" r:id="rId28"/>
-    <p:sldId id="290" r:id="rId29"/>
-    <p:sldId id="291" r:id="rId30"/>
-    <p:sldId id="292" r:id="rId31"/>
-    <p:sldId id="293" r:id="rId32"/>
-    <p:sldId id="294" r:id="rId33"/>
+    <p:sldId id="296" r:id="rId5"/>
+    <p:sldId id="286" r:id="rId6"/>
+    <p:sldId id="274" r:id="rId7"/>
+    <p:sldId id="273" r:id="rId8"/>
+    <p:sldId id="270" r:id="rId9"/>
+    <p:sldId id="269" r:id="rId10"/>
+    <p:sldId id="271" r:id="rId11"/>
+    <p:sldId id="265" r:id="rId12"/>
+    <p:sldId id="263" r:id="rId13"/>
+    <p:sldId id="262" r:id="rId14"/>
+    <p:sldId id="264" r:id="rId15"/>
+    <p:sldId id="261" r:id="rId16"/>
+    <p:sldId id="260" r:id="rId17"/>
+    <p:sldId id="257" r:id="rId18"/>
+    <p:sldId id="259" r:id="rId19"/>
+    <p:sldId id="281" r:id="rId20"/>
+    <p:sldId id="282" r:id="rId21"/>
+    <p:sldId id="278" r:id="rId22"/>
+    <p:sldId id="279" r:id="rId23"/>
+    <p:sldId id="283" r:id="rId24"/>
+    <p:sldId id="284" r:id="rId25"/>
+    <p:sldId id="285" r:id="rId26"/>
+    <p:sldId id="287" r:id="rId27"/>
+    <p:sldId id="288" r:id="rId28"/>
+    <p:sldId id="289" r:id="rId29"/>
+    <p:sldId id="290" r:id="rId30"/>
+    <p:sldId id="291" r:id="rId31"/>
+    <p:sldId id="292" r:id="rId32"/>
+    <p:sldId id="293" r:id="rId33"/>
+    <p:sldId id="294" r:id="rId34"/>
+    <p:sldId id="295" r:id="rId35"/>
   </p:sldIdLst>
   <p:sldSz cx="9144000" cy="6858000" type="screen4x3"/>
   <p:notesSz cx="6881813" cy="9296400"/>
@@ -224,7 +226,7 @@
             <a:fld id="{DA103462-62C8-4D37-8F5B-118728760487}" type="datetimeFigureOut">
               <a:rPr lang="en-US" smtClean="0"/>
               <a:pPr/>
-              <a:t>5/1/2018</a:t>
+              <a:t>5/10/2018</a:t>
             </a:fld>
             <a:endParaRPr lang="en-US"/>
           </a:p>
@@ -558,7 +560,7 @@
             <a:fld id="{567AA99F-ECF6-4184-8659-A74ADBB8BEE7}" type="slidenum">
               <a:rPr lang="en-US" smtClean="0"/>
               <a:pPr/>
-              <a:t>12</a:t>
+              <a:t>13</a:t>
             </a:fld>
             <a:endParaRPr lang="en-US"/>
           </a:p>
@@ -754,7 +756,7 @@
             <a:fld id="{E16763B4-E773-4657-92E3-F14AA5DD8006}" type="datetimeFigureOut">
               <a:rPr lang="en-US" smtClean="0"/>
               <a:pPr/>
-              <a:t>5/1/2018</a:t>
+              <a:t>5/10/2018</a:t>
             </a:fld>
             <a:endParaRPr lang="en-US"/>
           </a:p>
@@ -921,7 +923,7 @@
             <a:fld id="{E16763B4-E773-4657-92E3-F14AA5DD8006}" type="datetimeFigureOut">
               <a:rPr lang="en-US" smtClean="0"/>
               <a:pPr/>
-              <a:t>5/1/2018</a:t>
+              <a:t>5/10/2018</a:t>
             </a:fld>
             <a:endParaRPr lang="en-US"/>
           </a:p>
@@ -1098,7 +1100,7 @@
             <a:fld id="{E16763B4-E773-4657-92E3-F14AA5DD8006}" type="datetimeFigureOut">
               <a:rPr lang="en-US" smtClean="0"/>
               <a:pPr/>
-              <a:t>5/1/2018</a:t>
+              <a:t>5/10/2018</a:t>
             </a:fld>
             <a:endParaRPr lang="en-US"/>
           </a:p>
@@ -1265,7 +1267,7 @@
             <a:fld id="{E16763B4-E773-4657-92E3-F14AA5DD8006}" type="datetimeFigureOut">
               <a:rPr lang="en-US" smtClean="0"/>
               <a:pPr/>
-              <a:t>5/1/2018</a:t>
+              <a:t>5/10/2018</a:t>
             </a:fld>
             <a:endParaRPr lang="en-US"/>
           </a:p>
@@ -1508,7 +1510,7 @@
             <a:fld id="{E16763B4-E773-4657-92E3-F14AA5DD8006}" type="datetimeFigureOut">
               <a:rPr lang="en-US" smtClean="0"/>
               <a:pPr/>
-              <a:t>5/1/2018</a:t>
+              <a:t>5/10/2018</a:t>
             </a:fld>
             <a:endParaRPr lang="en-US"/>
           </a:p>
@@ -1793,7 +1795,7 @@
             <a:fld id="{E16763B4-E773-4657-92E3-F14AA5DD8006}" type="datetimeFigureOut">
               <a:rPr lang="en-US" smtClean="0"/>
               <a:pPr/>
-              <a:t>5/1/2018</a:t>
+              <a:t>5/10/2018</a:t>
             </a:fld>
             <a:endParaRPr lang="en-US"/>
           </a:p>
@@ -2212,7 +2214,7 @@
             <a:fld id="{E16763B4-E773-4657-92E3-F14AA5DD8006}" type="datetimeFigureOut">
               <a:rPr lang="en-US" smtClean="0"/>
               <a:pPr/>
-              <a:t>5/1/2018</a:t>
+              <a:t>5/10/2018</a:t>
             </a:fld>
             <a:endParaRPr lang="en-US"/>
           </a:p>
@@ -2327,7 +2329,7 @@
             <a:fld id="{E16763B4-E773-4657-92E3-F14AA5DD8006}" type="datetimeFigureOut">
               <a:rPr lang="en-US" smtClean="0"/>
               <a:pPr/>
-              <a:t>5/1/2018</a:t>
+              <a:t>5/10/2018</a:t>
             </a:fld>
             <a:endParaRPr lang="en-US"/>
           </a:p>
@@ -2419,7 +2421,7 @@
             <a:fld id="{E16763B4-E773-4657-92E3-F14AA5DD8006}" type="datetimeFigureOut">
               <a:rPr lang="en-US" smtClean="0"/>
               <a:pPr/>
-              <a:t>5/1/2018</a:t>
+              <a:t>5/10/2018</a:t>
             </a:fld>
             <a:endParaRPr lang="en-US"/>
           </a:p>
@@ -2693,7 +2695,7 @@
             <a:fld id="{E16763B4-E773-4657-92E3-F14AA5DD8006}" type="datetimeFigureOut">
               <a:rPr lang="en-US" smtClean="0"/>
               <a:pPr/>
-              <a:t>5/1/2018</a:t>
+              <a:t>5/10/2018</a:t>
             </a:fld>
             <a:endParaRPr lang="en-US"/>
           </a:p>
@@ -2943,7 +2945,7 @@
             <a:fld id="{E16763B4-E773-4657-92E3-F14AA5DD8006}" type="datetimeFigureOut">
               <a:rPr lang="en-US" smtClean="0"/>
               <a:pPr/>
-              <a:t>5/1/2018</a:t>
+              <a:t>5/10/2018</a:t>
             </a:fld>
             <a:endParaRPr lang="en-US"/>
           </a:p>
@@ -3153,7 +3155,7 @@
             <a:fld id="{E16763B4-E773-4657-92E3-F14AA5DD8006}" type="datetimeFigureOut">
               <a:rPr lang="en-US" smtClean="0"/>
               <a:pPr/>
-              <a:t>5/1/2018</a:t>
+              <a:t>5/10/2018</a:t>
             </a:fld>
             <a:endParaRPr lang="en-US"/>
           </a:p>
@@ -3647,6 +3649,152 @@
       </p:grpSpPr>
       <p:pic>
         <p:nvPicPr>
+          <p:cNvPr id="2" name="Picture 4" descr="https://documents.lucidchart.com/documents/dfc3c2ca-e536-4306-a9f8-3dbc98030bd9/pages/0_0?a=464&amp;x=71&amp;y=45&amp;w=617&amp;h=164&amp;store=1&amp;accept=image%2F*&amp;auth=LCA%20f9928d6348a38a990ac5d913eced5b3a1cbd63a8-ts%3D1474064470"/>
+          <p:cNvPicPr>
+            <a:picLocks noChangeAspect="1" noChangeArrowheads="1"/>
+          </p:cNvPicPr>
+          <p:nvPr/>
+        </p:nvPicPr>
+        <p:blipFill>
+          <a:blip r:embed="rId2" cstate="print"/>
+          <a:srcRect/>
+          <a:stretch>
+            <a:fillRect/>
+          </a:stretch>
+        </p:blipFill>
+        <p:spPr bwMode="auto">
+          <a:xfrm>
+            <a:off x="304801" y="152401"/>
+            <a:ext cx="3810000" cy="1012160"/>
+          </a:xfrm>
+          <a:prstGeom prst="rect">
+            <a:avLst/>
+          </a:prstGeom>
+          <a:noFill/>
+        </p:spPr>
+      </p:pic>
+      <p:pic>
+        <p:nvPicPr>
+          <p:cNvPr id="2050" name="Picture 2"/>
+          <p:cNvPicPr>
+            <a:picLocks noChangeAspect="1" noChangeArrowheads="1"/>
+          </p:cNvPicPr>
+          <p:nvPr/>
+        </p:nvPicPr>
+        <p:blipFill>
+          <a:blip r:embed="rId3" cstate="print"/>
+          <a:srcRect/>
+          <a:stretch>
+            <a:fillRect/>
+          </a:stretch>
+        </p:blipFill>
+        <p:spPr bwMode="auto">
+          <a:xfrm>
+            <a:off x="152400" y="1795114"/>
+            <a:ext cx="2160000" cy="4834286"/>
+          </a:xfrm>
+          <a:prstGeom prst="rect">
+            <a:avLst/>
+          </a:prstGeom>
+          <a:noFill/>
+          <a:ln w="9525">
+            <a:noFill/>
+            <a:miter lim="800000"/>
+            <a:headEnd/>
+            <a:tailEnd/>
+          </a:ln>
+        </p:spPr>
+      </p:pic>
+      <p:pic>
+        <p:nvPicPr>
+          <p:cNvPr id="2051" name="Picture 3"/>
+          <p:cNvPicPr>
+            <a:picLocks noChangeAspect="1" noChangeArrowheads="1"/>
+          </p:cNvPicPr>
+          <p:nvPr/>
+        </p:nvPicPr>
+        <p:blipFill>
+          <a:blip r:embed="rId4" cstate="print"/>
+          <a:stretch>
+            <a:fillRect/>
+          </a:stretch>
+        </p:blipFill>
+        <p:spPr bwMode="auto">
+          <a:xfrm>
+            <a:off x="2321485" y="1648371"/>
+            <a:ext cx="1945715" cy="4371429"/>
+          </a:xfrm>
+          <a:prstGeom prst="rect">
+            <a:avLst/>
+          </a:prstGeom>
+          <a:noFill/>
+          <a:ln w="9525">
+            <a:noFill/>
+            <a:miter lim="800000"/>
+            <a:headEnd/>
+            <a:tailEnd/>
+          </a:ln>
+        </p:spPr>
+      </p:pic>
+      <p:pic>
+        <p:nvPicPr>
+          <p:cNvPr id="3075" name="Picture 3"/>
+          <p:cNvPicPr>
+            <a:picLocks noChangeAspect="1" noChangeArrowheads="1"/>
+          </p:cNvPicPr>
+          <p:nvPr/>
+        </p:nvPicPr>
+        <p:blipFill>
+          <a:blip r:embed="rId5" cstate="print"/>
+          <a:srcRect/>
+          <a:stretch>
+            <a:fillRect/>
+          </a:stretch>
+        </p:blipFill>
+        <p:spPr bwMode="auto">
+          <a:xfrm>
+            <a:off x="5200650" y="19050"/>
+            <a:ext cx="3867150" cy="5086350"/>
+          </a:xfrm>
+          <a:prstGeom prst="rect">
+            <a:avLst/>
+          </a:prstGeom>
+          <a:noFill/>
+          <a:ln w="9525">
+            <a:noFill/>
+            <a:miter lim="800000"/>
+            <a:headEnd/>
+            <a:tailEnd/>
+          </a:ln>
+        </p:spPr>
+      </p:pic>
+    </p:spTree>
+  </p:cSld>
+  <p:clrMapOvr>
+    <a:masterClrMapping/>
+  </p:clrMapOvr>
+</p:sld>
+</file>
+
+<file path=ppt/slides/slide11.xml><?xml version="1.0" encoding="utf-8"?>
+<p:sld xmlns:a="http://schemas.openxmlformats.org/drawingml/2006/main" xmlns:r="http://schemas.openxmlformats.org/officeDocument/2006/relationships" xmlns:p="http://schemas.openxmlformats.org/presentationml/2006/main">
+  <p:cSld>
+    <p:spTree>
+      <p:nvGrpSpPr>
+        <p:cNvPr id="1" name=""/>
+        <p:cNvGrpSpPr/>
+        <p:nvPr/>
+      </p:nvGrpSpPr>
+      <p:grpSpPr>
+        <a:xfrm>
+          <a:off x="0" y="0"/>
+          <a:ext cx="0" cy="0"/>
+          <a:chOff x="0" y="0"/>
+          <a:chExt cx="0" cy="0"/>
+        </a:xfrm>
+      </p:grpSpPr>
+      <p:pic>
+        <p:nvPicPr>
           <p:cNvPr id="24584" name="Picture 8" descr="https://documents.lucidchart.com/documents/b22fed2a-8de3-4da3-87e2-44be1432b360/pages/7bxiNxcws7Ud?a=1199&amp;x=548&amp;y=83&amp;w=788&amp;h=827&amp;store=1&amp;accept=image%2F*&amp;auth=LCA%20cb3f1b74c20abd87697158bbddde8836311520eb-ts%3D1520376928"/>
           <p:cNvPicPr>
             <a:picLocks noChangeAspect="1" noChangeArrowheads="1"/>
@@ -3775,7 +3923,7 @@
 </p:sld>
 </file>
 
-<file path=ppt/slides/slide11.xml><?xml version="1.0" encoding="utf-8"?>
+<file path=ppt/slides/slide12.xml><?xml version="1.0" encoding="utf-8"?>
 <p:sld xmlns:a="http://schemas.openxmlformats.org/drawingml/2006/main" xmlns:r="http://schemas.openxmlformats.org/officeDocument/2006/relationships" xmlns:p="http://schemas.openxmlformats.org/presentationml/2006/main">
   <p:cSld>
     <p:spTree>
@@ -4008,7 +4156,7 @@
 </p:sld>
 </file>
 
-<file path=ppt/slides/slide12.xml><?xml version="1.0" encoding="utf-8"?>
+<file path=ppt/slides/slide13.xml><?xml version="1.0" encoding="utf-8"?>
 <p:sld xmlns:a="http://schemas.openxmlformats.org/drawingml/2006/main" xmlns:r="http://schemas.openxmlformats.org/officeDocument/2006/relationships" xmlns:p="http://schemas.openxmlformats.org/presentationml/2006/main">
   <p:cSld>
     <p:spTree>
@@ -4123,7 +4271,7 @@
 </p:sld>
 </file>
 
-<file path=ppt/slides/slide13.xml><?xml version="1.0" encoding="utf-8"?>
+<file path=ppt/slides/slide14.xml><?xml version="1.0" encoding="utf-8"?>
 <p:sld xmlns:a="http://schemas.openxmlformats.org/drawingml/2006/main" xmlns:r="http://schemas.openxmlformats.org/officeDocument/2006/relationships" xmlns:p="http://schemas.openxmlformats.org/presentationml/2006/main">
   <p:cSld>
     <p:spTree>
@@ -11490,7 +11638,7 @@
 </p:sld>
 </file>
 
-<file path=ppt/slides/slide14.xml><?xml version="1.0" encoding="utf-8"?>
+<file path=ppt/slides/slide15.xml><?xml version="1.0" encoding="utf-8"?>
 <p:sld xmlns:a="http://schemas.openxmlformats.org/drawingml/2006/main" xmlns:r="http://schemas.openxmlformats.org/officeDocument/2006/relationships" xmlns:p="http://schemas.openxmlformats.org/presentationml/2006/main">
   <p:cSld>
     <p:spTree>
@@ -11579,7 +11727,7 @@
 </p:sld>
 </file>
 
-<file path=ppt/slides/slide15.xml><?xml version="1.0" encoding="utf-8"?>
+<file path=ppt/slides/slide16.xml><?xml version="1.0" encoding="utf-8"?>
 <p:sld xmlns:a="http://schemas.openxmlformats.org/drawingml/2006/main" xmlns:r="http://schemas.openxmlformats.org/officeDocument/2006/relationships" xmlns:p="http://schemas.openxmlformats.org/presentationml/2006/main">
   <p:cSld>
     <p:spTree>
@@ -11668,7 +11816,7 @@
 </p:sld>
 </file>
 
-<file path=ppt/slides/slide16.xml><?xml version="1.0" encoding="utf-8"?>
+<file path=ppt/slides/slide17.xml><?xml version="1.0" encoding="utf-8"?>
 <p:sld xmlns:a="http://schemas.openxmlformats.org/drawingml/2006/main" xmlns:r="http://schemas.openxmlformats.org/officeDocument/2006/relationships" xmlns:p="http://schemas.openxmlformats.org/presentationml/2006/main">
   <p:cSld>
     <p:spTree>
@@ -11783,7 +11931,7 @@
 </p:sld>
 </file>
 
-<file path=ppt/slides/slide17.xml><?xml version="1.0" encoding="utf-8"?>
+<file path=ppt/slides/slide18.xml><?xml version="1.0" encoding="utf-8"?>
 <p:sld xmlns:a="http://schemas.openxmlformats.org/drawingml/2006/main" xmlns:r="http://schemas.openxmlformats.org/officeDocument/2006/relationships" xmlns:p="http://schemas.openxmlformats.org/presentationml/2006/main">
   <p:cSld>
     <p:spTree>
@@ -11898,7 +12046,7 @@
 </p:sld>
 </file>
 
-<file path=ppt/slides/slide18.xml><?xml version="1.0" encoding="utf-8"?>
+<file path=ppt/slides/slide19.xml><?xml version="1.0" encoding="utf-8"?>
 <p:sld xmlns:a="http://schemas.openxmlformats.org/drawingml/2006/main" xmlns:r="http://schemas.openxmlformats.org/officeDocument/2006/relationships" xmlns:p="http://schemas.openxmlformats.org/presentationml/2006/main">
   <p:cSld>
     <p:spTree>
@@ -12912,7 +13060,143 @@
 </p:sld>
 </file>
 
-<file path=ppt/slides/slide19.xml><?xml version="1.0" encoding="utf-8"?>
+<file path=ppt/slides/slide2.xml><?xml version="1.0" encoding="utf-8"?>
+<p:sld xmlns:a="http://schemas.openxmlformats.org/drawingml/2006/main" xmlns:r="http://schemas.openxmlformats.org/officeDocument/2006/relationships" xmlns:p="http://schemas.openxmlformats.org/presentationml/2006/main">
+  <p:cSld>
+    <p:spTree>
+      <p:nvGrpSpPr>
+        <p:cNvPr id="1" name=""/>
+        <p:cNvGrpSpPr/>
+        <p:nvPr/>
+      </p:nvGrpSpPr>
+      <p:grpSpPr>
+        <a:xfrm>
+          <a:off x="0" y="0"/>
+          <a:ext cx="0" cy="0"/>
+          <a:chOff x="0" y="0"/>
+          <a:chExt cx="0" cy="0"/>
+        </a:xfrm>
+      </p:grpSpPr>
+      <p:grpSp>
+        <p:nvGrpSpPr>
+          <p:cNvPr id="4" name="Group 3"/>
+          <p:cNvGrpSpPr/>
+          <p:nvPr/>
+        </p:nvGrpSpPr>
+        <p:grpSpPr>
+          <a:xfrm>
+            <a:off x="180975" y="3733800"/>
+            <a:ext cx="8353425" cy="2971800"/>
+            <a:chOff x="38100" y="3733801"/>
+            <a:chExt cx="8353425" cy="2971800"/>
+          </a:xfrm>
+        </p:grpSpPr>
+        <p:pic>
+          <p:nvPicPr>
+            <p:cNvPr id="1026" name="Picture 2"/>
+            <p:cNvPicPr>
+              <a:picLocks noChangeAspect="1" noChangeArrowheads="1"/>
+            </p:cNvPicPr>
+            <p:nvPr/>
+          </p:nvPicPr>
+          <p:blipFill>
+            <a:blip r:embed="rId2" cstate="print"/>
+            <a:srcRect/>
+            <a:stretch>
+              <a:fillRect/>
+            </a:stretch>
+          </p:blipFill>
+          <p:spPr bwMode="auto">
+            <a:xfrm rot="16200000">
+              <a:off x="2662237" y="1366837"/>
+              <a:ext cx="2714625" cy="7962900"/>
+            </a:xfrm>
+            <a:prstGeom prst="rect">
+              <a:avLst/>
+            </a:prstGeom>
+            <a:noFill/>
+            <a:ln w="9525">
+              <a:noFill/>
+              <a:miter lim="800000"/>
+              <a:headEnd/>
+              <a:tailEnd/>
+            </a:ln>
+          </p:spPr>
+        </p:pic>
+        <p:pic>
+          <p:nvPicPr>
+            <p:cNvPr id="1027" name="Picture 3"/>
+            <p:cNvPicPr>
+              <a:picLocks noChangeAspect="1" noChangeArrowheads="1"/>
+            </p:cNvPicPr>
+            <p:nvPr/>
+          </p:nvPicPr>
+          <p:blipFill>
+            <a:blip r:embed="rId3" cstate="print"/>
+            <a:srcRect/>
+            <a:stretch>
+              <a:fillRect/>
+            </a:stretch>
+          </p:blipFill>
+          <p:spPr bwMode="auto">
+            <a:xfrm rot="16200000">
+              <a:off x="6443663" y="4757738"/>
+              <a:ext cx="2971800" cy="923925"/>
+            </a:xfrm>
+            <a:prstGeom prst="rect">
+              <a:avLst/>
+            </a:prstGeom>
+            <a:noFill/>
+            <a:ln w="9525">
+              <a:noFill/>
+              <a:miter lim="800000"/>
+              <a:headEnd/>
+              <a:tailEnd/>
+            </a:ln>
+          </p:spPr>
+        </p:pic>
+      </p:grpSp>
+      <p:pic>
+        <p:nvPicPr>
+          <p:cNvPr id="6" name="Picture 2"/>
+          <p:cNvPicPr>
+            <a:picLocks noChangeAspect="1" noChangeArrowheads="1"/>
+          </p:cNvPicPr>
+          <p:nvPr/>
+        </p:nvPicPr>
+        <p:blipFill>
+          <a:blip r:embed="rId4" cstate="print"/>
+          <a:srcRect/>
+          <a:stretch>
+            <a:fillRect/>
+          </a:stretch>
+        </p:blipFill>
+        <p:spPr bwMode="auto">
+          <a:xfrm rot="16200000">
+            <a:off x="404812" y="-500062"/>
+            <a:ext cx="4352925" cy="4895850"/>
+          </a:xfrm>
+          <a:prstGeom prst="rect">
+            <a:avLst/>
+          </a:prstGeom>
+          <a:noFill/>
+          <a:ln w="9525">
+            <a:noFill/>
+            <a:miter lim="800000"/>
+            <a:headEnd/>
+            <a:tailEnd/>
+          </a:ln>
+        </p:spPr>
+      </p:pic>
+    </p:spTree>
+  </p:cSld>
+  <p:clrMapOvr>
+    <a:masterClrMapping/>
+  </p:clrMapOvr>
+</p:sld>
+</file>
+
+<file path=ppt/slides/slide20.xml><?xml version="1.0" encoding="utf-8"?>
 <p:sld xmlns:a="http://schemas.openxmlformats.org/drawingml/2006/main" xmlns:r="http://schemas.openxmlformats.org/officeDocument/2006/relationships" xmlns:p="http://schemas.openxmlformats.org/presentationml/2006/main">
   <p:cSld>
     <p:spTree>
@@ -13926,143 +14210,7 @@
 </p:sld>
 </file>
 
-<file path=ppt/slides/slide2.xml><?xml version="1.0" encoding="utf-8"?>
-<p:sld xmlns:a="http://schemas.openxmlformats.org/drawingml/2006/main" xmlns:r="http://schemas.openxmlformats.org/officeDocument/2006/relationships" xmlns:p="http://schemas.openxmlformats.org/presentationml/2006/main">
-  <p:cSld>
-    <p:spTree>
-      <p:nvGrpSpPr>
-        <p:cNvPr id="1" name=""/>
-        <p:cNvGrpSpPr/>
-        <p:nvPr/>
-      </p:nvGrpSpPr>
-      <p:grpSpPr>
-        <a:xfrm>
-          <a:off x="0" y="0"/>
-          <a:ext cx="0" cy="0"/>
-          <a:chOff x="0" y="0"/>
-          <a:chExt cx="0" cy="0"/>
-        </a:xfrm>
-      </p:grpSpPr>
-      <p:grpSp>
-        <p:nvGrpSpPr>
-          <p:cNvPr id="4" name="Group 3"/>
-          <p:cNvGrpSpPr/>
-          <p:nvPr/>
-        </p:nvGrpSpPr>
-        <p:grpSpPr>
-          <a:xfrm>
-            <a:off x="180975" y="3733800"/>
-            <a:ext cx="8353425" cy="2971800"/>
-            <a:chOff x="38100" y="3733801"/>
-            <a:chExt cx="8353425" cy="2971800"/>
-          </a:xfrm>
-        </p:grpSpPr>
-        <p:pic>
-          <p:nvPicPr>
-            <p:cNvPr id="1026" name="Picture 2"/>
-            <p:cNvPicPr>
-              <a:picLocks noChangeAspect="1" noChangeArrowheads="1"/>
-            </p:cNvPicPr>
-            <p:nvPr/>
-          </p:nvPicPr>
-          <p:blipFill>
-            <a:blip r:embed="rId2" cstate="print"/>
-            <a:srcRect/>
-            <a:stretch>
-              <a:fillRect/>
-            </a:stretch>
-          </p:blipFill>
-          <p:spPr bwMode="auto">
-            <a:xfrm rot="16200000">
-              <a:off x="2662237" y="1366837"/>
-              <a:ext cx="2714625" cy="7962900"/>
-            </a:xfrm>
-            <a:prstGeom prst="rect">
-              <a:avLst/>
-            </a:prstGeom>
-            <a:noFill/>
-            <a:ln w="9525">
-              <a:noFill/>
-              <a:miter lim="800000"/>
-              <a:headEnd/>
-              <a:tailEnd/>
-            </a:ln>
-          </p:spPr>
-        </p:pic>
-        <p:pic>
-          <p:nvPicPr>
-            <p:cNvPr id="1027" name="Picture 3"/>
-            <p:cNvPicPr>
-              <a:picLocks noChangeAspect="1" noChangeArrowheads="1"/>
-            </p:cNvPicPr>
-            <p:nvPr/>
-          </p:nvPicPr>
-          <p:blipFill>
-            <a:blip r:embed="rId3" cstate="print"/>
-            <a:srcRect/>
-            <a:stretch>
-              <a:fillRect/>
-            </a:stretch>
-          </p:blipFill>
-          <p:spPr bwMode="auto">
-            <a:xfrm rot="16200000">
-              <a:off x="6443663" y="4757738"/>
-              <a:ext cx="2971800" cy="923925"/>
-            </a:xfrm>
-            <a:prstGeom prst="rect">
-              <a:avLst/>
-            </a:prstGeom>
-            <a:noFill/>
-            <a:ln w="9525">
-              <a:noFill/>
-              <a:miter lim="800000"/>
-              <a:headEnd/>
-              <a:tailEnd/>
-            </a:ln>
-          </p:spPr>
-        </p:pic>
-      </p:grpSp>
-      <p:pic>
-        <p:nvPicPr>
-          <p:cNvPr id="6" name="Picture 2"/>
-          <p:cNvPicPr>
-            <a:picLocks noChangeAspect="1" noChangeArrowheads="1"/>
-          </p:cNvPicPr>
-          <p:nvPr/>
-        </p:nvPicPr>
-        <p:blipFill>
-          <a:blip r:embed="rId4" cstate="print"/>
-          <a:srcRect/>
-          <a:stretch>
-            <a:fillRect/>
-          </a:stretch>
-        </p:blipFill>
-        <p:spPr bwMode="auto">
-          <a:xfrm rot="16200000">
-            <a:off x="404812" y="-500062"/>
-            <a:ext cx="4352925" cy="4895850"/>
-          </a:xfrm>
-          <a:prstGeom prst="rect">
-            <a:avLst/>
-          </a:prstGeom>
-          <a:noFill/>
-          <a:ln w="9525">
-            <a:noFill/>
-            <a:miter lim="800000"/>
-            <a:headEnd/>
-            <a:tailEnd/>
-          </a:ln>
-        </p:spPr>
-      </p:pic>
-    </p:spTree>
-  </p:cSld>
-  <p:clrMapOvr>
-    <a:masterClrMapping/>
-  </p:clrMapOvr>
-</p:sld>
-</file>
-
-<file path=ppt/slides/slide20.xml><?xml version="1.0" encoding="utf-8"?>
+<file path=ppt/slides/slide21.xml><?xml version="1.0" encoding="utf-8"?>
 <p:sld xmlns:a="http://schemas.openxmlformats.org/drawingml/2006/main" xmlns:r="http://schemas.openxmlformats.org/officeDocument/2006/relationships" xmlns:p="http://schemas.openxmlformats.org/presentationml/2006/main">
   <p:cSld>
     <p:spTree>
@@ -14183,7 +14331,7 @@
 </p:sld>
 </file>
 
-<file path=ppt/slides/slide21.xml><?xml version="1.0" encoding="utf-8"?>
+<file path=ppt/slides/slide22.xml><?xml version="1.0" encoding="utf-8"?>
 <p:sld xmlns:a="http://schemas.openxmlformats.org/drawingml/2006/main" xmlns:r="http://schemas.openxmlformats.org/officeDocument/2006/relationships" xmlns:p="http://schemas.openxmlformats.org/presentationml/2006/main" show="0">
   <p:cSld>
     <p:spTree>
@@ -14293,7 +14441,7 @@
 </p:sld>
 </file>
 
-<file path=ppt/slides/slide22.xml><?xml version="1.0" encoding="utf-8"?>
+<file path=ppt/slides/slide23.xml><?xml version="1.0" encoding="utf-8"?>
 <p:sld xmlns:a="http://schemas.openxmlformats.org/drawingml/2006/main" xmlns:r="http://schemas.openxmlformats.org/officeDocument/2006/relationships" xmlns:p="http://schemas.openxmlformats.org/presentationml/2006/main">
   <p:cSld>
     <p:spTree>
@@ -14350,7 +14498,7 @@
 </p:sld>
 </file>
 
-<file path=ppt/slides/slide23.xml><?xml version="1.0" encoding="utf-8"?>
+<file path=ppt/slides/slide24.xml><?xml version="1.0" encoding="utf-8"?>
 <p:sld xmlns:a="http://schemas.openxmlformats.org/drawingml/2006/main" xmlns:r="http://schemas.openxmlformats.org/officeDocument/2006/relationships" xmlns:p="http://schemas.openxmlformats.org/presentationml/2006/main">
   <p:cSld>
     <p:spTree>
@@ -14535,7 +14683,7 @@
 </p:sld>
 </file>
 
-<file path=ppt/slides/slide24.xml><?xml version="1.0" encoding="utf-8"?>
+<file path=ppt/slides/slide25.xml><?xml version="1.0" encoding="utf-8"?>
 <p:sld xmlns:a="http://schemas.openxmlformats.org/drawingml/2006/main" xmlns:r="http://schemas.openxmlformats.org/officeDocument/2006/relationships" xmlns:p="http://schemas.openxmlformats.org/presentationml/2006/main">
   <p:cSld>
     <p:spTree>
@@ -15168,7 +15316,7 @@
 </p:sld>
 </file>
 
-<file path=ppt/slides/slide25.xml><?xml version="1.0" encoding="utf-8"?>
+<file path=ppt/slides/slide26.xml><?xml version="1.0" encoding="utf-8"?>
 <p:sld xmlns:a="http://schemas.openxmlformats.org/drawingml/2006/main" xmlns:r="http://schemas.openxmlformats.org/officeDocument/2006/relationships" xmlns:p="http://schemas.openxmlformats.org/presentationml/2006/main">
   <p:cSld>
     <p:spTree>
@@ -15257,7 +15405,7 @@
 </p:sld>
 </file>
 
-<file path=ppt/slides/slide26.xml><?xml version="1.0" encoding="utf-8"?>
+<file path=ppt/slides/slide27.xml><?xml version="1.0" encoding="utf-8"?>
 <p:sld xmlns:a="http://schemas.openxmlformats.org/drawingml/2006/main" xmlns:r="http://schemas.openxmlformats.org/officeDocument/2006/relationships" xmlns:p="http://schemas.openxmlformats.org/presentationml/2006/main">
   <p:cSld>
     <p:spTree>
@@ -15314,7 +15462,7 @@
 </p:sld>
 </file>
 
-<file path=ppt/slides/slide27.xml><?xml version="1.0" encoding="utf-8"?>
+<file path=ppt/slides/slide28.xml><?xml version="1.0" encoding="utf-8"?>
 <p:sld xmlns:a="http://schemas.openxmlformats.org/drawingml/2006/main" xmlns:r="http://schemas.openxmlformats.org/officeDocument/2006/relationships" xmlns:p="http://schemas.openxmlformats.org/presentationml/2006/main">
   <p:cSld>
     <p:spTree>
@@ -15450,11 +15598,7 @@
           <a:p>
             <a:r>
               <a:rPr lang="en-US" sz="1200" dirty="0" smtClean="0"/>
-              <a:t>Dynamic Programming (DP): </a:t>
-            </a:r>
-            <a:r>
-              <a:rPr lang="en-US" sz="1200" dirty="0" smtClean="0"/>
-              <a:t>Edit Distance</a:t>
+              <a:t>Dynamic Programming (DP): Edit Distance</a:t>
             </a:r>
             <a:endParaRPr lang="en-US" sz="1200" dirty="0"/>
           </a:p>
@@ -15468,7 +15612,7 @@
 </p:sld>
 </file>
 
-<file path=ppt/slides/slide28.xml><?xml version="1.0" encoding="utf-8"?>
+<file path=ppt/slides/slide29.xml><?xml version="1.0" encoding="utf-8"?>
 <p:sld xmlns:a="http://schemas.openxmlformats.org/drawingml/2006/main" xmlns:r="http://schemas.openxmlformats.org/officeDocument/2006/relationships" xmlns:p="http://schemas.openxmlformats.org/presentationml/2006/main">
   <p:cSld>
     <p:spTree>
@@ -15572,11 +15716,7 @@
           <a:p>
             <a:r>
               <a:rPr lang="en-US" sz="1200" dirty="0" smtClean="0"/>
-              <a:t>Dynamic Programming (DP): </a:t>
-            </a:r>
-            <a:r>
-              <a:rPr lang="en-US" sz="1200" dirty="0" smtClean="0"/>
-              <a:t>Edit Distance</a:t>
+              <a:t>Dynamic Programming (DP): Edit Distance</a:t>
             </a:r>
             <a:endParaRPr lang="en-US" sz="1200" dirty="0"/>
           </a:p>
@@ -15590,7 +15730,96 @@
 </p:sld>
 </file>
 
-<file path=ppt/slides/slide29.xml><?xml version="1.0" encoding="utf-8"?>
+<file path=ppt/slides/slide3.xml><?xml version="1.0" encoding="utf-8"?>
+<p:sld xmlns:a="http://schemas.openxmlformats.org/drawingml/2006/main" xmlns:r="http://schemas.openxmlformats.org/officeDocument/2006/relationships" xmlns:p="http://schemas.openxmlformats.org/presentationml/2006/main">
+  <p:cSld>
+    <p:spTree>
+      <p:nvGrpSpPr>
+        <p:cNvPr id="1" name=""/>
+        <p:cNvGrpSpPr/>
+        <p:nvPr/>
+      </p:nvGrpSpPr>
+      <p:grpSpPr>
+        <a:xfrm>
+          <a:off x="0" y="0"/>
+          <a:ext cx="0" cy="0"/>
+          <a:chOff x="0" y="0"/>
+          <a:chExt cx="0" cy="0"/>
+        </a:xfrm>
+      </p:grpSpPr>
+      <p:pic>
+        <p:nvPicPr>
+          <p:cNvPr id="1027" name="Picture 3"/>
+          <p:cNvPicPr>
+            <a:picLocks noChangeAspect="1" noChangeArrowheads="1"/>
+          </p:cNvPicPr>
+          <p:nvPr/>
+        </p:nvPicPr>
+        <p:blipFill>
+          <a:blip r:embed="rId2" cstate="print"/>
+          <a:srcRect/>
+          <a:stretch>
+            <a:fillRect/>
+          </a:stretch>
+        </p:blipFill>
+        <p:spPr bwMode="auto">
+          <a:xfrm rot="16200000">
+            <a:off x="4591051" y="2200275"/>
+            <a:ext cx="2962275" cy="6048375"/>
+          </a:xfrm>
+          <a:prstGeom prst="rect">
+            <a:avLst/>
+          </a:prstGeom>
+          <a:noFill/>
+          <a:ln w="9525">
+            <a:noFill/>
+            <a:miter lim="800000"/>
+            <a:headEnd/>
+            <a:tailEnd/>
+          </a:ln>
+        </p:spPr>
+      </p:pic>
+      <p:pic>
+        <p:nvPicPr>
+          <p:cNvPr id="1028" name="Picture 4"/>
+          <p:cNvPicPr>
+            <a:picLocks noChangeAspect="1" noChangeArrowheads="1"/>
+          </p:cNvPicPr>
+          <p:nvPr/>
+        </p:nvPicPr>
+        <p:blipFill>
+          <a:blip r:embed="rId3" cstate="print"/>
+          <a:srcRect/>
+          <a:stretch>
+            <a:fillRect/>
+          </a:stretch>
+        </p:blipFill>
+        <p:spPr bwMode="auto">
+          <a:xfrm rot="16200000">
+            <a:off x="-323849" y="3600450"/>
+            <a:ext cx="3590925" cy="2638425"/>
+          </a:xfrm>
+          <a:prstGeom prst="rect">
+            <a:avLst/>
+          </a:prstGeom>
+          <a:noFill/>
+          <a:ln w="9525">
+            <a:noFill/>
+            <a:miter lim="800000"/>
+            <a:headEnd/>
+            <a:tailEnd/>
+          </a:ln>
+        </p:spPr>
+      </p:pic>
+    </p:spTree>
+  </p:cSld>
+  <p:clrMapOvr>
+    <a:masterClrMapping/>
+  </p:clrMapOvr>
+</p:sld>
+</file>
+
+<file path=ppt/slides/slide30.xml><?xml version="1.0" encoding="utf-8"?>
 <p:sld xmlns:a="http://schemas.openxmlformats.org/drawingml/2006/main" xmlns:r="http://schemas.openxmlformats.org/officeDocument/2006/relationships" xmlns:p="http://schemas.openxmlformats.org/presentationml/2006/main">
   <p:cSld>
     <p:spTree>
@@ -19510,11 +19739,7 @@
           <a:p>
             <a:r>
               <a:rPr lang="en-US" sz="1200" dirty="0" smtClean="0"/>
-              <a:t>Dynamic Programming (DP): </a:t>
-            </a:r>
-            <a:r>
-              <a:rPr lang="en-US" sz="1200" dirty="0" smtClean="0"/>
-              <a:t>Coin Changing Minimum</a:t>
+              <a:t>Dynamic Programming (DP): Coin Changing Minimum</a:t>
             </a:r>
             <a:endParaRPr lang="en-US" sz="1200" dirty="0"/>
           </a:p>
@@ -19528,96 +19753,7 @@
 </p:sld>
 </file>
 
-<file path=ppt/slides/slide3.xml><?xml version="1.0" encoding="utf-8"?>
-<p:sld xmlns:a="http://schemas.openxmlformats.org/drawingml/2006/main" xmlns:r="http://schemas.openxmlformats.org/officeDocument/2006/relationships" xmlns:p="http://schemas.openxmlformats.org/presentationml/2006/main">
-  <p:cSld>
-    <p:spTree>
-      <p:nvGrpSpPr>
-        <p:cNvPr id="1" name=""/>
-        <p:cNvGrpSpPr/>
-        <p:nvPr/>
-      </p:nvGrpSpPr>
-      <p:grpSpPr>
-        <a:xfrm>
-          <a:off x="0" y="0"/>
-          <a:ext cx="0" cy="0"/>
-          <a:chOff x="0" y="0"/>
-          <a:chExt cx="0" cy="0"/>
-        </a:xfrm>
-      </p:grpSpPr>
-      <p:pic>
-        <p:nvPicPr>
-          <p:cNvPr id="1027" name="Picture 3"/>
-          <p:cNvPicPr>
-            <a:picLocks noChangeAspect="1" noChangeArrowheads="1"/>
-          </p:cNvPicPr>
-          <p:nvPr/>
-        </p:nvPicPr>
-        <p:blipFill>
-          <a:blip r:embed="rId2" cstate="print"/>
-          <a:srcRect/>
-          <a:stretch>
-            <a:fillRect/>
-          </a:stretch>
-        </p:blipFill>
-        <p:spPr bwMode="auto">
-          <a:xfrm rot="16200000">
-            <a:off x="4591051" y="2200275"/>
-            <a:ext cx="2962275" cy="6048375"/>
-          </a:xfrm>
-          <a:prstGeom prst="rect">
-            <a:avLst/>
-          </a:prstGeom>
-          <a:noFill/>
-          <a:ln w="9525">
-            <a:noFill/>
-            <a:miter lim="800000"/>
-            <a:headEnd/>
-            <a:tailEnd/>
-          </a:ln>
-        </p:spPr>
-      </p:pic>
-      <p:pic>
-        <p:nvPicPr>
-          <p:cNvPr id="1028" name="Picture 4"/>
-          <p:cNvPicPr>
-            <a:picLocks noChangeAspect="1" noChangeArrowheads="1"/>
-          </p:cNvPicPr>
-          <p:nvPr/>
-        </p:nvPicPr>
-        <p:blipFill>
-          <a:blip r:embed="rId3" cstate="print"/>
-          <a:srcRect/>
-          <a:stretch>
-            <a:fillRect/>
-          </a:stretch>
-        </p:blipFill>
-        <p:spPr bwMode="auto">
-          <a:xfrm rot="16200000">
-            <a:off x="-323849" y="3600450"/>
-            <a:ext cx="3590925" cy="2638425"/>
-          </a:xfrm>
-          <a:prstGeom prst="rect">
-            <a:avLst/>
-          </a:prstGeom>
-          <a:noFill/>
-          <a:ln w="9525">
-            <a:noFill/>
-            <a:miter lim="800000"/>
-            <a:headEnd/>
-            <a:tailEnd/>
-          </a:ln>
-        </p:spPr>
-      </p:pic>
-    </p:spTree>
-  </p:cSld>
-  <p:clrMapOvr>
-    <a:masterClrMapping/>
-  </p:clrMapOvr>
-</p:sld>
-</file>
-
-<file path=ppt/slides/slide30.xml><?xml version="1.0" encoding="utf-8"?>
+<file path=ppt/slides/slide31.xml><?xml version="1.0" encoding="utf-8"?>
 <p:sld xmlns:a="http://schemas.openxmlformats.org/drawingml/2006/main" xmlns:r="http://schemas.openxmlformats.org/officeDocument/2006/relationships" xmlns:p="http://schemas.openxmlformats.org/presentationml/2006/main">
   <p:cSld>
     <p:spTree>
@@ -19754,11 +19890,7 @@
           <a:p>
             <a:r>
               <a:rPr lang="en-US" sz="1200" dirty="0" smtClean="0"/>
-              <a:t>Dynamic Programming (DP): </a:t>
-            </a:r>
-            <a:r>
-              <a:rPr lang="en-US" sz="1200" dirty="0" smtClean="0"/>
-              <a:t>0/1 Knapsack</a:t>
+              <a:t>Dynamic Programming (DP): 0/1 Knapsack</a:t>
             </a:r>
             <a:endParaRPr lang="en-US" sz="1200" dirty="0"/>
           </a:p>
@@ -19772,7 +19904,7 @@
 </p:sld>
 </file>
 
-<file path=ppt/slides/slide31.xml><?xml version="1.0" encoding="utf-8"?>
+<file path=ppt/slides/slide32.xml><?xml version="1.0" encoding="utf-8"?>
 <p:sld xmlns:a="http://schemas.openxmlformats.org/drawingml/2006/main" xmlns:r="http://schemas.openxmlformats.org/officeDocument/2006/relationships" xmlns:p="http://schemas.openxmlformats.org/presentationml/2006/main">
   <p:cSld>
     <p:spTree>
@@ -19823,7 +19955,7 @@
       </p:pic>
       <p:pic>
         <p:nvPicPr>
-          <p:cNvPr id="1028" name="Picture 4"/>
+          <p:cNvPr id="5" name="Picture 5"/>
           <p:cNvPicPr>
             <a:picLocks noChangeAspect="1" noChangeArrowheads="1"/>
           </p:cNvPicPr>
@@ -19831,38 +19963,6 @@
         </p:nvPicPr>
         <p:blipFill>
           <a:blip r:embed="rId3" cstate="print"/>
-          <a:srcRect/>
-          <a:stretch>
-            <a:fillRect/>
-          </a:stretch>
-        </p:blipFill>
-        <p:spPr bwMode="auto">
-          <a:xfrm>
-            <a:off x="7490178" y="228600"/>
-            <a:ext cx="1425222" cy="4191000"/>
-          </a:xfrm>
-          <a:prstGeom prst="rect">
-            <a:avLst/>
-          </a:prstGeom>
-          <a:noFill/>
-          <a:ln w="9525">
-            <a:noFill/>
-            <a:miter lim="800000"/>
-            <a:headEnd/>
-            <a:tailEnd/>
-          </a:ln>
-        </p:spPr>
-      </p:pic>
-      <p:pic>
-        <p:nvPicPr>
-          <p:cNvPr id="5" name="Picture 5"/>
-          <p:cNvPicPr>
-            <a:picLocks noChangeAspect="1" noChangeArrowheads="1"/>
-          </p:cNvPicPr>
-          <p:nvPr/>
-        </p:nvPicPr>
-        <p:blipFill>
-          <a:blip r:embed="rId4" cstate="print"/>
           <a:srcRect/>
           <a:stretch>
             <a:fillRect/>
@@ -19915,6 +20015,38 @@
           </a:p>
         </p:txBody>
       </p:sp>
+      <p:pic>
+        <p:nvPicPr>
+          <p:cNvPr id="3074" name="Picture 2"/>
+          <p:cNvPicPr>
+            <a:picLocks noChangeAspect="1" noChangeArrowheads="1"/>
+          </p:cNvPicPr>
+          <p:nvPr/>
+        </p:nvPicPr>
+        <p:blipFill>
+          <a:blip r:embed="rId4" cstate="print"/>
+          <a:srcRect/>
+          <a:stretch>
+            <a:fillRect/>
+          </a:stretch>
+        </p:blipFill>
+        <p:spPr bwMode="auto">
+          <a:xfrm>
+            <a:off x="7077075" y="228600"/>
+            <a:ext cx="1762125" cy="3508656"/>
+          </a:xfrm>
+          <a:prstGeom prst="rect">
+            <a:avLst/>
+          </a:prstGeom>
+          <a:noFill/>
+          <a:ln w="9525">
+            <a:noFill/>
+            <a:miter lim="800000"/>
+            <a:headEnd/>
+            <a:tailEnd/>
+          </a:ln>
+        </p:spPr>
+      </p:pic>
     </p:spTree>
   </p:cSld>
   <p:clrMapOvr>
@@ -19923,7 +20055,7 @@
 </p:sld>
 </file>
 
-<file path=ppt/slides/slide32.xml><?xml version="1.0" encoding="utf-8"?>
+<file path=ppt/slides/slide33.xml><?xml version="1.0" encoding="utf-8"?>
 <p:sld xmlns:a="http://schemas.openxmlformats.org/drawingml/2006/main" xmlns:r="http://schemas.openxmlformats.org/officeDocument/2006/relationships" xmlns:p="http://schemas.openxmlformats.org/presentationml/2006/main">
   <p:cSld>
     <p:spTree>
@@ -20074,7 +20206,354 @@
 </p:sld>
 </file>
 
+<file path=ppt/slides/slide34.xml><?xml version="1.0" encoding="utf-8"?>
+<p:sld xmlns:a="http://schemas.openxmlformats.org/drawingml/2006/main" xmlns:r="http://schemas.openxmlformats.org/officeDocument/2006/relationships" xmlns:p="http://schemas.openxmlformats.org/presentationml/2006/main">
+  <p:cSld>
+    <p:spTree>
+      <p:nvGrpSpPr>
+        <p:cNvPr id="1" name=""/>
+        <p:cNvGrpSpPr/>
+        <p:nvPr/>
+      </p:nvGrpSpPr>
+      <p:grpSpPr>
+        <a:xfrm>
+          <a:off x="0" y="0"/>
+          <a:ext cx="0" cy="0"/>
+          <a:chOff x="0" y="0"/>
+          <a:chExt cx="0" cy="0"/>
+        </a:xfrm>
+      </p:grpSpPr>
+      <p:grpSp>
+        <p:nvGrpSpPr>
+          <p:cNvPr id="16" name="Group 15"/>
+          <p:cNvGrpSpPr/>
+          <p:nvPr/>
+        </p:nvGrpSpPr>
+        <p:grpSpPr>
+          <a:xfrm>
+            <a:off x="152400" y="342900"/>
+            <a:ext cx="8839200" cy="6172200"/>
+            <a:chOff x="152400" y="152400"/>
+            <a:chExt cx="8839200" cy="6172200"/>
+          </a:xfrm>
+        </p:grpSpPr>
+        <p:grpSp>
+          <p:nvGrpSpPr>
+            <p:cNvPr id="15" name="Group 14"/>
+            <p:cNvGrpSpPr/>
+            <p:nvPr/>
+          </p:nvGrpSpPr>
+          <p:grpSpPr>
+            <a:xfrm>
+              <a:off x="152400" y="152400"/>
+              <a:ext cx="8839200" cy="3048000"/>
+              <a:chOff x="152400" y="152400"/>
+              <a:chExt cx="8839200" cy="3048000"/>
+            </a:xfrm>
+          </p:grpSpPr>
+          <p:pic>
+            <p:nvPicPr>
+              <p:cNvPr id="1026" name="Picture 2" descr="https://documents.lucidchart.com/documents/14fd326f-785e-4357-a295-dcf50f379366/pages/YGcM5DNywbTK?a=1046&amp;x=29&amp;y=29&amp;w=662&amp;h=662&amp;store=1&amp;accept=image%2F*&amp;auth=LCA%2045508821ee7b3be5614effb5c9016ed99afe184a-ts%3D1525820511"/>
+              <p:cNvPicPr>
+                <a:picLocks noChangeAspect="1" noChangeArrowheads="1"/>
+              </p:cNvPicPr>
+              <p:nvPr/>
+            </p:nvPicPr>
+            <p:blipFill>
+              <a:blip r:embed="rId2" cstate="print"/>
+              <a:srcRect/>
+              <a:stretch>
+                <a:fillRect/>
+              </a:stretch>
+            </p:blipFill>
+            <p:spPr bwMode="auto">
+              <a:xfrm>
+                <a:off x="152400" y="152400"/>
+                <a:ext cx="3048000" cy="3048000"/>
+              </a:xfrm>
+              <a:prstGeom prst="rect">
+                <a:avLst/>
+              </a:prstGeom>
+              <a:noFill/>
+            </p:spPr>
+          </p:pic>
+          <p:pic>
+            <p:nvPicPr>
+              <p:cNvPr id="4" name="Picture 2" descr="https://documents.lucidchart.com/documents/14fd326f-785e-4357-a295-dcf50f379366/pages/YGcM5DNywbTK?a=1046&amp;x=29&amp;y=29&amp;w=662&amp;h=662&amp;store=1&amp;accept=image%2F*&amp;auth=LCA%2045508821ee7b3be5614effb5c9016ed99afe184a-ts%3D1525820511"/>
+              <p:cNvPicPr>
+                <a:picLocks noChangeAspect="1" noChangeArrowheads="1"/>
+              </p:cNvPicPr>
+              <p:nvPr/>
+            </p:nvPicPr>
+            <p:blipFill>
+              <a:blip r:embed="rId2" cstate="print"/>
+              <a:srcRect/>
+              <a:stretch>
+                <a:fillRect/>
+              </a:stretch>
+            </p:blipFill>
+            <p:spPr bwMode="auto">
+              <a:xfrm>
+                <a:off x="3048000" y="152400"/>
+                <a:ext cx="3048000" cy="3048000"/>
+              </a:xfrm>
+              <a:prstGeom prst="rect">
+                <a:avLst/>
+              </a:prstGeom>
+              <a:noFill/>
+            </p:spPr>
+          </p:pic>
+          <p:pic>
+            <p:nvPicPr>
+              <p:cNvPr id="9" name="Picture 2" descr="https://documents.lucidchart.com/documents/14fd326f-785e-4357-a295-dcf50f379366/pages/YGcM5DNywbTK?a=1046&amp;x=29&amp;y=29&amp;w=662&amp;h=662&amp;store=1&amp;accept=image%2F*&amp;auth=LCA%2045508821ee7b3be5614effb5c9016ed99afe184a-ts%3D1525820511"/>
+              <p:cNvPicPr>
+                <a:picLocks noChangeAspect="1" noChangeArrowheads="1"/>
+              </p:cNvPicPr>
+              <p:nvPr/>
+            </p:nvPicPr>
+            <p:blipFill>
+              <a:blip r:embed="rId2" cstate="print"/>
+              <a:srcRect/>
+              <a:stretch>
+                <a:fillRect/>
+              </a:stretch>
+            </p:blipFill>
+            <p:spPr bwMode="auto">
+              <a:xfrm>
+                <a:off x="5943600" y="152400"/>
+                <a:ext cx="3048000" cy="3048000"/>
+              </a:xfrm>
+              <a:prstGeom prst="rect">
+                <a:avLst/>
+              </a:prstGeom>
+              <a:noFill/>
+            </p:spPr>
+          </p:pic>
+        </p:grpSp>
+        <p:grpSp>
+          <p:nvGrpSpPr>
+            <p:cNvPr id="14" name="Group 13"/>
+            <p:cNvGrpSpPr/>
+            <p:nvPr/>
+          </p:nvGrpSpPr>
+          <p:grpSpPr>
+            <a:xfrm>
+              <a:off x="152400" y="3276600"/>
+              <a:ext cx="8839200" cy="3048000"/>
+              <a:chOff x="152400" y="3276600"/>
+              <a:chExt cx="8839200" cy="3048000"/>
+            </a:xfrm>
+          </p:grpSpPr>
+          <p:pic>
+            <p:nvPicPr>
+              <p:cNvPr id="11" name="Picture 2" descr="https://documents.lucidchart.com/documents/14fd326f-785e-4357-a295-dcf50f379366/pages/YGcM5DNywbTK?a=1046&amp;x=29&amp;y=29&amp;w=662&amp;h=662&amp;store=1&amp;accept=image%2F*&amp;auth=LCA%2045508821ee7b3be5614effb5c9016ed99afe184a-ts%3D1525820511"/>
+              <p:cNvPicPr>
+                <a:picLocks noChangeAspect="1" noChangeArrowheads="1"/>
+              </p:cNvPicPr>
+              <p:nvPr/>
+            </p:nvPicPr>
+            <p:blipFill>
+              <a:blip r:embed="rId2" cstate="print"/>
+              <a:srcRect/>
+              <a:stretch>
+                <a:fillRect/>
+              </a:stretch>
+            </p:blipFill>
+            <p:spPr bwMode="auto">
+              <a:xfrm>
+                <a:off x="152400" y="3276600"/>
+                <a:ext cx="3048000" cy="3048000"/>
+              </a:xfrm>
+              <a:prstGeom prst="rect">
+                <a:avLst/>
+              </a:prstGeom>
+              <a:noFill/>
+            </p:spPr>
+          </p:pic>
+          <p:pic>
+            <p:nvPicPr>
+              <p:cNvPr id="12" name="Picture 2" descr="https://documents.lucidchart.com/documents/14fd326f-785e-4357-a295-dcf50f379366/pages/YGcM5DNywbTK?a=1046&amp;x=29&amp;y=29&amp;w=662&amp;h=662&amp;store=1&amp;accept=image%2F*&amp;auth=LCA%2045508821ee7b3be5614effb5c9016ed99afe184a-ts%3D1525820511"/>
+              <p:cNvPicPr>
+                <a:picLocks noChangeAspect="1" noChangeArrowheads="1"/>
+              </p:cNvPicPr>
+              <p:nvPr/>
+            </p:nvPicPr>
+            <p:blipFill>
+              <a:blip r:embed="rId2" cstate="print"/>
+              <a:srcRect/>
+              <a:stretch>
+                <a:fillRect/>
+              </a:stretch>
+            </p:blipFill>
+            <p:spPr bwMode="auto">
+              <a:xfrm>
+                <a:off x="3048000" y="3276600"/>
+                <a:ext cx="3048000" cy="3048000"/>
+              </a:xfrm>
+              <a:prstGeom prst="rect">
+                <a:avLst/>
+              </a:prstGeom>
+              <a:noFill/>
+            </p:spPr>
+          </p:pic>
+          <p:pic>
+            <p:nvPicPr>
+              <p:cNvPr id="13" name="Picture 2" descr="https://documents.lucidchart.com/documents/14fd326f-785e-4357-a295-dcf50f379366/pages/YGcM5DNywbTK?a=1046&amp;x=29&amp;y=29&amp;w=662&amp;h=662&amp;store=1&amp;accept=image%2F*&amp;auth=LCA%2045508821ee7b3be5614effb5c9016ed99afe184a-ts%3D1525820511"/>
+              <p:cNvPicPr>
+                <a:picLocks noChangeAspect="1" noChangeArrowheads="1"/>
+              </p:cNvPicPr>
+              <p:nvPr/>
+            </p:nvPicPr>
+            <p:blipFill>
+              <a:blip r:embed="rId2" cstate="print"/>
+              <a:srcRect/>
+              <a:stretch>
+                <a:fillRect/>
+              </a:stretch>
+            </p:blipFill>
+            <p:spPr bwMode="auto">
+              <a:xfrm>
+                <a:off x="5943600" y="3276600"/>
+                <a:ext cx="3048000" cy="3048000"/>
+              </a:xfrm>
+              <a:prstGeom prst="rect">
+                <a:avLst/>
+              </a:prstGeom>
+              <a:noFill/>
+            </p:spPr>
+          </p:pic>
+        </p:grpSp>
+      </p:grpSp>
+    </p:spTree>
+  </p:cSld>
+  <p:clrMapOvr>
+    <a:masterClrMapping/>
+  </p:clrMapOvr>
+</p:sld>
+</file>
+
 <file path=ppt/slides/slide4.xml><?xml version="1.0" encoding="utf-8"?>
+<p:sld xmlns:a="http://schemas.openxmlformats.org/drawingml/2006/main" xmlns:r="http://schemas.openxmlformats.org/officeDocument/2006/relationships" xmlns:p="http://schemas.openxmlformats.org/presentationml/2006/main">
+  <p:cSld>
+    <p:spTree>
+      <p:nvGrpSpPr>
+        <p:cNvPr id="1" name=""/>
+        <p:cNvGrpSpPr/>
+        <p:nvPr/>
+      </p:nvGrpSpPr>
+      <p:grpSpPr>
+        <a:xfrm>
+          <a:off x="0" y="0"/>
+          <a:ext cx="0" cy="0"/>
+          <a:chOff x="0" y="0"/>
+          <a:chExt cx="0" cy="0"/>
+        </a:xfrm>
+      </p:grpSpPr>
+      <p:pic>
+        <p:nvPicPr>
+          <p:cNvPr id="1026" name="Picture 2"/>
+          <p:cNvPicPr>
+            <a:picLocks noChangeAspect="1" noChangeArrowheads="1"/>
+          </p:cNvPicPr>
+          <p:nvPr/>
+        </p:nvPicPr>
+        <p:blipFill>
+          <a:blip r:embed="rId2" cstate="print"/>
+          <a:srcRect/>
+          <a:stretch>
+            <a:fillRect/>
+          </a:stretch>
+        </p:blipFill>
+        <p:spPr bwMode="auto">
+          <a:xfrm>
+            <a:off x="228600" y="152400"/>
+            <a:ext cx="3724275" cy="4305300"/>
+          </a:xfrm>
+          <a:prstGeom prst="rect">
+            <a:avLst/>
+          </a:prstGeom>
+          <a:noFill/>
+          <a:ln w="9525">
+            <a:noFill/>
+            <a:miter lim="800000"/>
+            <a:headEnd/>
+            <a:tailEnd/>
+          </a:ln>
+        </p:spPr>
+      </p:pic>
+      <p:pic>
+        <p:nvPicPr>
+          <p:cNvPr id="1027" name="Picture 3"/>
+          <p:cNvPicPr>
+            <a:picLocks noChangeAspect="1" noChangeArrowheads="1"/>
+          </p:cNvPicPr>
+          <p:nvPr/>
+        </p:nvPicPr>
+        <p:blipFill>
+          <a:blip r:embed="rId3" cstate="print"/>
+          <a:srcRect/>
+          <a:stretch>
+            <a:fillRect/>
+          </a:stretch>
+        </p:blipFill>
+        <p:spPr bwMode="auto">
+          <a:xfrm>
+            <a:off x="8382000" y="152400"/>
+            <a:ext cx="409524" cy="1104762"/>
+          </a:xfrm>
+          <a:prstGeom prst="rect">
+            <a:avLst/>
+          </a:prstGeom>
+          <a:noFill/>
+          <a:ln w="9525">
+            <a:noFill/>
+            <a:miter lim="800000"/>
+            <a:headEnd/>
+            <a:tailEnd/>
+          </a:ln>
+        </p:spPr>
+      </p:pic>
+      <p:pic>
+        <p:nvPicPr>
+          <p:cNvPr id="1030" name="Picture 6"/>
+          <p:cNvPicPr>
+            <a:picLocks noChangeAspect="1" noChangeArrowheads="1"/>
+          </p:cNvPicPr>
+          <p:nvPr/>
+        </p:nvPicPr>
+        <p:blipFill>
+          <a:blip r:embed="rId4" cstate="print"/>
+          <a:srcRect/>
+          <a:stretch>
+            <a:fillRect/>
+          </a:stretch>
+        </p:blipFill>
+        <p:spPr bwMode="auto">
+          <a:xfrm>
+            <a:off x="7848600" y="152400"/>
+            <a:ext cx="428625" cy="2228850"/>
+          </a:xfrm>
+          <a:prstGeom prst="rect">
+            <a:avLst/>
+          </a:prstGeom>
+          <a:noFill/>
+          <a:ln w="9525">
+            <a:noFill/>
+            <a:miter lim="800000"/>
+            <a:headEnd/>
+            <a:tailEnd/>
+          </a:ln>
+        </p:spPr>
+      </p:pic>
+    </p:spTree>
+  </p:cSld>
+  <p:clrMapOvr>
+    <a:masterClrMapping/>
+  </p:clrMapOvr>
+</p:sld>
+</file>
+
+<file path=ppt/slides/slide5.xml><?xml version="1.0" encoding="utf-8"?>
 <p:sld xmlns:a="http://schemas.openxmlformats.org/drawingml/2006/main" xmlns:r="http://schemas.openxmlformats.org/officeDocument/2006/relationships" xmlns:p="http://schemas.openxmlformats.org/presentationml/2006/main">
   <p:cSld>
     <p:spTree>
@@ -20397,7 +20876,7 @@
 </p:sld>
 </file>
 
-<file path=ppt/slides/slide5.xml><?xml version="1.0" encoding="utf-8"?>
+<file path=ppt/slides/slide6.xml><?xml version="1.0" encoding="utf-8"?>
 <p:sld xmlns:a="http://schemas.openxmlformats.org/drawingml/2006/main" xmlns:r="http://schemas.openxmlformats.org/officeDocument/2006/relationships" xmlns:p="http://schemas.openxmlformats.org/presentationml/2006/main">
   <p:cSld>
     <p:spTree>
@@ -20475,7 +20954,7 @@
 </p:sld>
 </file>
 
-<file path=ppt/slides/slide6.xml><?xml version="1.0" encoding="utf-8"?>
+<file path=ppt/slides/slide7.xml><?xml version="1.0" encoding="utf-8"?>
 <p:sld xmlns:a="http://schemas.openxmlformats.org/drawingml/2006/main" xmlns:r="http://schemas.openxmlformats.org/officeDocument/2006/relationships" xmlns:p="http://schemas.openxmlformats.org/presentationml/2006/main">
   <p:cSld>
     <p:spTree>
@@ -20648,7 +21127,7 @@
 </p:sld>
 </file>
 
-<file path=ppt/slides/slide7.xml><?xml version="1.0" encoding="utf-8"?>
+<file path=ppt/slides/slide8.xml><?xml version="1.0" encoding="utf-8"?>
 <p:sld xmlns:a="http://schemas.openxmlformats.org/drawingml/2006/main" xmlns:r="http://schemas.openxmlformats.org/officeDocument/2006/relationships" xmlns:p="http://schemas.openxmlformats.org/presentationml/2006/main">
   <p:cSld>
     <p:spTree>
@@ -20934,7 +21413,7 @@
 </p:sld>
 </file>
 
-<file path=ppt/slides/slide8.xml><?xml version="1.0" encoding="utf-8"?>
+<file path=ppt/slides/slide9.xml><?xml version="1.0" encoding="utf-8"?>
 <p:sld xmlns:a="http://schemas.openxmlformats.org/drawingml/2006/main" xmlns:r="http://schemas.openxmlformats.org/officeDocument/2006/relationships" xmlns:p="http://schemas.openxmlformats.org/presentationml/2006/main">
   <p:cSld>
     <p:spTree>
@@ -21059,152 +21538,6 @@
           <a:xfrm>
             <a:off x="4419600" y="219075"/>
             <a:ext cx="4714875" cy="5876925"/>
-          </a:xfrm>
-          <a:prstGeom prst="rect">
-            <a:avLst/>
-          </a:prstGeom>
-          <a:noFill/>
-          <a:ln w="9525">
-            <a:noFill/>
-            <a:miter lim="800000"/>
-            <a:headEnd/>
-            <a:tailEnd/>
-          </a:ln>
-        </p:spPr>
-      </p:pic>
-    </p:spTree>
-  </p:cSld>
-  <p:clrMapOvr>
-    <a:masterClrMapping/>
-  </p:clrMapOvr>
-</p:sld>
-</file>
-
-<file path=ppt/slides/slide9.xml><?xml version="1.0" encoding="utf-8"?>
-<p:sld xmlns:a="http://schemas.openxmlformats.org/drawingml/2006/main" xmlns:r="http://schemas.openxmlformats.org/officeDocument/2006/relationships" xmlns:p="http://schemas.openxmlformats.org/presentationml/2006/main">
-  <p:cSld>
-    <p:spTree>
-      <p:nvGrpSpPr>
-        <p:cNvPr id="1" name=""/>
-        <p:cNvGrpSpPr/>
-        <p:nvPr/>
-      </p:nvGrpSpPr>
-      <p:grpSpPr>
-        <a:xfrm>
-          <a:off x="0" y="0"/>
-          <a:ext cx="0" cy="0"/>
-          <a:chOff x="0" y="0"/>
-          <a:chExt cx="0" cy="0"/>
-        </a:xfrm>
-      </p:grpSpPr>
-      <p:pic>
-        <p:nvPicPr>
-          <p:cNvPr id="2" name="Picture 4" descr="https://documents.lucidchart.com/documents/dfc3c2ca-e536-4306-a9f8-3dbc98030bd9/pages/0_0?a=464&amp;x=71&amp;y=45&amp;w=617&amp;h=164&amp;store=1&amp;accept=image%2F*&amp;auth=LCA%20f9928d6348a38a990ac5d913eced5b3a1cbd63a8-ts%3D1474064470"/>
-          <p:cNvPicPr>
-            <a:picLocks noChangeAspect="1" noChangeArrowheads="1"/>
-          </p:cNvPicPr>
-          <p:nvPr/>
-        </p:nvPicPr>
-        <p:blipFill>
-          <a:blip r:embed="rId2" cstate="print"/>
-          <a:srcRect/>
-          <a:stretch>
-            <a:fillRect/>
-          </a:stretch>
-        </p:blipFill>
-        <p:spPr bwMode="auto">
-          <a:xfrm>
-            <a:off x="304801" y="152401"/>
-            <a:ext cx="3810000" cy="1012160"/>
-          </a:xfrm>
-          <a:prstGeom prst="rect">
-            <a:avLst/>
-          </a:prstGeom>
-          <a:noFill/>
-        </p:spPr>
-      </p:pic>
-      <p:pic>
-        <p:nvPicPr>
-          <p:cNvPr id="2050" name="Picture 2"/>
-          <p:cNvPicPr>
-            <a:picLocks noChangeAspect="1" noChangeArrowheads="1"/>
-          </p:cNvPicPr>
-          <p:nvPr/>
-        </p:nvPicPr>
-        <p:blipFill>
-          <a:blip r:embed="rId3" cstate="print"/>
-          <a:srcRect/>
-          <a:stretch>
-            <a:fillRect/>
-          </a:stretch>
-        </p:blipFill>
-        <p:spPr bwMode="auto">
-          <a:xfrm>
-            <a:off x="152400" y="1795114"/>
-            <a:ext cx="2160000" cy="4834286"/>
-          </a:xfrm>
-          <a:prstGeom prst="rect">
-            <a:avLst/>
-          </a:prstGeom>
-          <a:noFill/>
-          <a:ln w="9525">
-            <a:noFill/>
-            <a:miter lim="800000"/>
-            <a:headEnd/>
-            <a:tailEnd/>
-          </a:ln>
-        </p:spPr>
-      </p:pic>
-      <p:pic>
-        <p:nvPicPr>
-          <p:cNvPr id="2051" name="Picture 3"/>
-          <p:cNvPicPr>
-            <a:picLocks noChangeAspect="1" noChangeArrowheads="1"/>
-          </p:cNvPicPr>
-          <p:nvPr/>
-        </p:nvPicPr>
-        <p:blipFill>
-          <a:blip r:embed="rId4" cstate="print"/>
-          <a:stretch>
-            <a:fillRect/>
-          </a:stretch>
-        </p:blipFill>
-        <p:spPr bwMode="auto">
-          <a:xfrm>
-            <a:off x="2321485" y="1648371"/>
-            <a:ext cx="1945715" cy="4371429"/>
-          </a:xfrm>
-          <a:prstGeom prst="rect">
-            <a:avLst/>
-          </a:prstGeom>
-          <a:noFill/>
-          <a:ln w="9525">
-            <a:noFill/>
-            <a:miter lim="800000"/>
-            <a:headEnd/>
-            <a:tailEnd/>
-          </a:ln>
-        </p:spPr>
-      </p:pic>
-      <p:pic>
-        <p:nvPicPr>
-          <p:cNvPr id="3075" name="Picture 3"/>
-          <p:cNvPicPr>
-            <a:picLocks noChangeAspect="1" noChangeArrowheads="1"/>
-          </p:cNvPicPr>
-          <p:nvPr/>
-        </p:nvPicPr>
-        <p:blipFill>
-          <a:blip r:embed="rId5" cstate="print"/>
-          <a:srcRect/>
-          <a:stretch>
-            <a:fillRect/>
-          </a:stretch>
-        </p:blipFill>
-        <p:spPr bwMode="auto">
-          <a:xfrm>
-            <a:off x="5200650" y="19050"/>
-            <a:ext cx="3867150" cy="5086350"/>
           </a:xfrm>
           <a:prstGeom prst="rect">
             <a:avLst/>

</xml_diff>